<commit_message>
alteracoes no pptx 1
</commit_message>
<xml_diff>
--- a/Projeto1/Apresentação.pptx
+++ b/Projeto1/Apresentação.pptx
@@ -5,19 +5,23 @@
     <p:sldMasterId id="2147483648" r:id="rId1"/>
   </p:sldMasterIdLst>
   <p:notesMasterIdLst>
-    <p:notesMasterId r:id="rId9"/>
+    <p:notesMasterId r:id="rId13"/>
   </p:notesMasterIdLst>
   <p:handoutMasterIdLst>
-    <p:handoutMasterId r:id="rId10"/>
+    <p:handoutMasterId r:id="rId14"/>
   </p:handoutMasterIdLst>
   <p:sldIdLst>
     <p:sldId id="256" r:id="rId2"/>
-    <p:sldId id="261" r:id="rId3"/>
-    <p:sldId id="260" r:id="rId4"/>
-    <p:sldId id="259" r:id="rId5"/>
+    <p:sldId id="260" r:id="rId3"/>
+    <p:sldId id="259" r:id="rId4"/>
+    <p:sldId id="263" r:id="rId5"/>
     <p:sldId id="257" r:id="rId6"/>
-    <p:sldId id="258" r:id="rId7"/>
-    <p:sldId id="262" r:id="rId8"/>
+    <p:sldId id="264" r:id="rId7"/>
+    <p:sldId id="265" r:id="rId8"/>
+    <p:sldId id="266" r:id="rId9"/>
+    <p:sldId id="258" r:id="rId10"/>
+    <p:sldId id="267" r:id="rId11"/>
+    <p:sldId id="262" r:id="rId12"/>
   </p:sldIdLst>
   <p:sldSz cx="12192000" cy="6858000"/>
   <p:notesSz cx="6858000" cy="9144000"/>
@@ -127,12 +131,173 @@
 </p:presentation>
 </file>
 
-<file path=ppt/revisionInfo.xml><?xml version="1.0" encoding="utf-8"?>
-<p1510:revInfo xmlns:a="http://schemas.openxmlformats.org/drawingml/2006/main" xmlns:r="http://schemas.openxmlformats.org/officeDocument/2006/relationships" xmlns:p1510="http://schemas.microsoft.com/office/powerpoint/2015/10/main">
-  <p1510:revLst>
-    <p1510:client id="{A401BA04-C5DF-4F93-AB5F-7E52559ADC44}" v="202" dt="2022-04-18T23:26:41.333"/>
-  </p1510:revLst>
-</p1510:revInfo>
+<file path=ppt/changesInfos/changesInfo1.xml><?xml version="1.0" encoding="utf-8"?>
+<pc:chgInfo xmlns:a="http://schemas.openxmlformats.org/drawingml/2006/main" xmlns:r="http://schemas.openxmlformats.org/officeDocument/2006/relationships" xmlns:ac="http://schemas.microsoft.com/office/drawing/2013/main/command" xmlns:pc="http://schemas.microsoft.com/office/powerpoint/2013/main/command">
+  <pc:docChgLst>
+    <pc:chgData name="George Luís Costa Ribeiro" userId="65d98055-ae44-4795-8a8e-9d00780538cc" providerId="ADAL" clId="{127FE27D-6E0B-4E3C-A670-63BD7E90AADF}"/>
+    <pc:docChg chg="undo custSel addSld delSld modSld">
+      <pc:chgData name="George Luís Costa Ribeiro" userId="65d98055-ae44-4795-8a8e-9d00780538cc" providerId="ADAL" clId="{127FE27D-6E0B-4E3C-A670-63BD7E90AADF}" dt="2022-04-20T14:56:16.432" v="169" actId="1076"/>
+      <pc:docMkLst>
+        <pc:docMk/>
+      </pc:docMkLst>
+      <pc:sldChg chg="addSp delSp modSp mod">
+        <pc:chgData name="George Luís Costa Ribeiro" userId="65d98055-ae44-4795-8a8e-9d00780538cc" providerId="ADAL" clId="{127FE27D-6E0B-4E3C-A670-63BD7E90AADF}" dt="2022-04-20T14:42:38.389" v="55" actId="1076"/>
+        <pc:sldMkLst>
+          <pc:docMk/>
+          <pc:sldMk cId="779202726" sldId="259"/>
+        </pc:sldMkLst>
+        <pc:spChg chg="add del mod">
+          <ac:chgData name="George Luís Costa Ribeiro" userId="65d98055-ae44-4795-8a8e-9d00780538cc" providerId="ADAL" clId="{127FE27D-6E0B-4E3C-A670-63BD7E90AADF}" dt="2022-04-20T14:41:36.234" v="47"/>
+          <ac:spMkLst>
+            <pc:docMk/>
+            <pc:sldMk cId="779202726" sldId="259"/>
+            <ac:spMk id="3" creationId="{49A8F561-3067-4906-84D9-7520A9534D33}"/>
+          </ac:spMkLst>
+        </pc:spChg>
+        <pc:spChg chg="add mod">
+          <ac:chgData name="George Luís Costa Ribeiro" userId="65d98055-ae44-4795-8a8e-9d00780538cc" providerId="ADAL" clId="{127FE27D-6E0B-4E3C-A670-63BD7E90AADF}" dt="2022-04-20T14:42:18.274" v="50" actId="14100"/>
+          <ac:spMkLst>
+            <pc:docMk/>
+            <pc:sldMk cId="779202726" sldId="259"/>
+            <ac:spMk id="5" creationId="{840B1D34-D772-499A-B6C3-C08A55312C83}"/>
+          </ac:spMkLst>
+        </pc:spChg>
+        <pc:spChg chg="add mod">
+          <ac:chgData name="George Luís Costa Ribeiro" userId="65d98055-ae44-4795-8a8e-9d00780538cc" providerId="ADAL" clId="{127FE27D-6E0B-4E3C-A670-63BD7E90AADF}" dt="2022-04-20T14:42:25.991" v="52" actId="1076"/>
+          <ac:spMkLst>
+            <pc:docMk/>
+            <pc:sldMk cId="779202726" sldId="259"/>
+            <ac:spMk id="6" creationId="{2C7554B4-AEF6-4759-B5CF-10E311E87E60}"/>
+          </ac:spMkLst>
+        </pc:spChg>
+        <pc:picChg chg="mod">
+          <ac:chgData name="George Luís Costa Ribeiro" userId="65d98055-ae44-4795-8a8e-9d00780538cc" providerId="ADAL" clId="{127FE27D-6E0B-4E3C-A670-63BD7E90AADF}" dt="2022-04-20T14:42:38.389" v="55" actId="1076"/>
+          <ac:picMkLst>
+            <pc:docMk/>
+            <pc:sldMk cId="779202726" sldId="259"/>
+            <ac:picMk id="4" creationId="{59F5F620-CD62-2C4F-B275-4E948EE8F8E8}"/>
+          </ac:picMkLst>
+        </pc:picChg>
+      </pc:sldChg>
+      <pc:sldChg chg="modSp mod">
+        <pc:chgData name="George Luís Costa Ribeiro" userId="65d98055-ae44-4795-8a8e-9d00780538cc" providerId="ADAL" clId="{127FE27D-6E0B-4E3C-A670-63BD7E90AADF}" dt="2022-04-20T14:44:02.703" v="63" actId="14100"/>
+        <pc:sldMkLst>
+          <pc:docMk/>
+          <pc:sldMk cId="2878285795" sldId="260"/>
+        </pc:sldMkLst>
+        <pc:picChg chg="mod">
+          <ac:chgData name="George Luís Costa Ribeiro" userId="65d98055-ae44-4795-8a8e-9d00780538cc" providerId="ADAL" clId="{127FE27D-6E0B-4E3C-A670-63BD7E90AADF}" dt="2022-04-20T14:44:02.703" v="63" actId="14100"/>
+          <ac:picMkLst>
+            <pc:docMk/>
+            <pc:sldMk cId="2878285795" sldId="260"/>
+            <ac:picMk id="4" creationId="{BC08F1D8-A08D-A3D0-F907-1F964B0D6CD9}"/>
+          </ac:picMkLst>
+        </pc:picChg>
+      </pc:sldChg>
+      <pc:sldChg chg="addSp delSp modSp mod">
+        <pc:chgData name="George Luís Costa Ribeiro" userId="65d98055-ae44-4795-8a8e-9d00780538cc" providerId="ADAL" clId="{127FE27D-6E0B-4E3C-A670-63BD7E90AADF}" dt="2022-04-20T14:43:57.461" v="62" actId="14100"/>
+        <pc:sldMkLst>
+          <pc:docMk/>
+          <pc:sldMk cId="4254428302" sldId="261"/>
+        </pc:sldMkLst>
+        <pc:spChg chg="add del mod">
+          <ac:chgData name="George Luís Costa Ribeiro" userId="65d98055-ae44-4795-8a8e-9d00780538cc" providerId="ADAL" clId="{127FE27D-6E0B-4E3C-A670-63BD7E90AADF}" dt="2022-04-20T14:41:10.519" v="39" actId="21"/>
+          <ac:spMkLst>
+            <pc:docMk/>
+            <pc:sldMk cId="4254428302" sldId="261"/>
+            <ac:spMk id="3" creationId="{5348A6BA-52F5-4825-8671-036500818E5E}"/>
+          </ac:spMkLst>
+        </pc:spChg>
+        <pc:spChg chg="add del mod">
+          <ac:chgData name="George Luís Costa Ribeiro" userId="65d98055-ae44-4795-8a8e-9d00780538cc" providerId="ADAL" clId="{127FE27D-6E0B-4E3C-A670-63BD7E90AADF}" dt="2022-04-20T14:41:22.908" v="42" actId="21"/>
+          <ac:spMkLst>
+            <pc:docMk/>
+            <pc:sldMk cId="4254428302" sldId="261"/>
+            <ac:spMk id="5" creationId="{AF16C8B1-B59E-4F33-B011-43113FFA2746}"/>
+          </ac:spMkLst>
+        </pc:spChg>
+        <pc:picChg chg="mod">
+          <ac:chgData name="George Luís Costa Ribeiro" userId="65d98055-ae44-4795-8a8e-9d00780538cc" providerId="ADAL" clId="{127FE27D-6E0B-4E3C-A670-63BD7E90AADF}" dt="2022-04-20T14:43:57.461" v="62" actId="14100"/>
+          <ac:picMkLst>
+            <pc:docMk/>
+            <pc:sldMk cId="4254428302" sldId="261"/>
+            <ac:picMk id="4" creationId="{02943A2A-30B6-5C36-FC5E-F806BED72F43}"/>
+          </ac:picMkLst>
+        </pc:picChg>
+      </pc:sldChg>
+      <pc:sldChg chg="addSp delSp modSp mod">
+        <pc:chgData name="George Luís Costa Ribeiro" userId="65d98055-ae44-4795-8a8e-9d00780538cc" providerId="ADAL" clId="{127FE27D-6E0B-4E3C-A670-63BD7E90AADF}" dt="2022-04-20T14:56:16.432" v="169" actId="1076"/>
+        <pc:sldMkLst>
+          <pc:docMk/>
+          <pc:sldMk cId="2360092736" sldId="262"/>
+        </pc:sldMkLst>
+        <pc:spChg chg="mod">
+          <ac:chgData name="George Luís Costa Ribeiro" userId="65d98055-ae44-4795-8a8e-9d00780538cc" providerId="ADAL" clId="{127FE27D-6E0B-4E3C-A670-63BD7E90AADF}" dt="2022-04-20T14:43:00.554" v="58" actId="20577"/>
+          <ac:spMkLst>
+            <pc:docMk/>
+            <pc:sldMk cId="2360092736" sldId="262"/>
+            <ac:spMk id="2" creationId="{8E65709B-49DD-8F12-0222-22E0521CB14E}"/>
+          </ac:spMkLst>
+        </pc:spChg>
+        <pc:spChg chg="add del mod">
+          <ac:chgData name="George Luís Costa Ribeiro" userId="65d98055-ae44-4795-8a8e-9d00780538cc" providerId="ADAL" clId="{127FE27D-6E0B-4E3C-A670-63BD7E90AADF}" dt="2022-04-20T14:56:12.875" v="168" actId="478"/>
+          <ac:spMkLst>
+            <pc:docMk/>
+            <pc:sldMk cId="2360092736" sldId="262"/>
+            <ac:spMk id="3" creationId="{05E44ECE-60B7-4934-A6A2-437F2C71B710}"/>
+          </ac:spMkLst>
+        </pc:spChg>
+        <pc:picChg chg="mod">
+          <ac:chgData name="George Luís Costa Ribeiro" userId="65d98055-ae44-4795-8a8e-9d00780538cc" providerId="ADAL" clId="{127FE27D-6E0B-4E3C-A670-63BD7E90AADF}" dt="2022-04-20T14:56:16.432" v="169" actId="1076"/>
+          <ac:picMkLst>
+            <pc:docMk/>
+            <pc:sldMk cId="2360092736" sldId="262"/>
+            <ac:picMk id="4" creationId="{F26630D5-88F7-E7E9-1BA1-5294B7F3C4C4}"/>
+          </ac:picMkLst>
+        </pc:picChg>
+      </pc:sldChg>
+      <pc:sldChg chg="addSp delSp modSp new del mod">
+        <pc:chgData name="George Luís Costa Ribeiro" userId="65d98055-ae44-4795-8a8e-9d00780538cc" providerId="ADAL" clId="{127FE27D-6E0B-4E3C-A670-63BD7E90AADF}" dt="2022-04-20T14:52:38.404" v="121" actId="2696"/>
+        <pc:sldMkLst>
+          <pc:docMk/>
+          <pc:sldMk cId="2214789829" sldId="263"/>
+        </pc:sldMkLst>
+        <pc:spChg chg="mod">
+          <ac:chgData name="George Luís Costa Ribeiro" userId="65d98055-ae44-4795-8a8e-9d00780538cc" providerId="ADAL" clId="{127FE27D-6E0B-4E3C-A670-63BD7E90AADF}" dt="2022-04-20T14:51:26.310" v="119" actId="20577"/>
+          <ac:spMkLst>
+            <pc:docMk/>
+            <pc:sldMk cId="2214789829" sldId="263"/>
+            <ac:spMk id="2" creationId="{937C5CEF-95D3-45EE-8908-7DF1D2D45078}"/>
+          </ac:spMkLst>
+        </pc:spChg>
+        <pc:spChg chg="del mod">
+          <ac:chgData name="George Luís Costa Ribeiro" userId="65d98055-ae44-4795-8a8e-9d00780538cc" providerId="ADAL" clId="{127FE27D-6E0B-4E3C-A670-63BD7E90AADF}" dt="2022-04-20T14:49:04.652" v="92" actId="478"/>
+          <ac:spMkLst>
+            <pc:docMk/>
+            <pc:sldMk cId="2214789829" sldId="263"/>
+            <ac:spMk id="3" creationId="{93599D86-FB66-4054-9F6C-BCF70389E5FB}"/>
+          </ac:spMkLst>
+        </pc:spChg>
+        <pc:spChg chg="add del mod">
+          <ac:chgData name="George Luís Costa Ribeiro" userId="65d98055-ae44-4795-8a8e-9d00780538cc" providerId="ADAL" clId="{127FE27D-6E0B-4E3C-A670-63BD7E90AADF}" dt="2022-04-20T14:49:06.976" v="93" actId="478"/>
+          <ac:spMkLst>
+            <pc:docMk/>
+            <pc:sldMk cId="2214789829" sldId="263"/>
+            <ac:spMk id="5" creationId="{5F57566C-CC45-4597-87A9-D82406A796CE}"/>
+          </ac:spMkLst>
+        </pc:spChg>
+        <pc:spChg chg="add del mod">
+          <ac:chgData name="George Luís Costa Ribeiro" userId="65d98055-ae44-4795-8a8e-9d00780538cc" providerId="ADAL" clId="{127FE27D-6E0B-4E3C-A670-63BD7E90AADF}" dt="2022-04-20T14:52:34.997" v="120" actId="478"/>
+          <ac:spMkLst>
+            <pc:docMk/>
+            <pc:sldMk cId="2214789829" sldId="263"/>
+            <ac:spMk id="6" creationId="{28DEC9AB-F1BB-4B12-BB3C-849800C5FD23}"/>
+          </ac:spMkLst>
+        </pc:spChg>
+      </pc:sldChg>
+    </pc:docChg>
+  </pc:docChgLst>
+</pc:chgInfo>
 </file>
 
 <file path=ppt/handoutMasters/handoutMaster1.xml><?xml version="1.0" encoding="utf-8"?>
@@ -13125,7 +13290,136 @@
 </p:sld>
 </file>
 
-<file path=ppt/slides/slide2.xml><?xml version="1.0" encoding="utf-8"?>
+<file path=ppt/slides/slide10.xml><?xml version="1.0" encoding="utf-8"?>
+<p:sld xmlns:a="http://schemas.openxmlformats.org/drawingml/2006/main" xmlns:r="http://schemas.openxmlformats.org/officeDocument/2006/relationships" xmlns:p="http://schemas.openxmlformats.org/presentationml/2006/main">
+  <p:cSld>
+    <p:spTree>
+      <p:nvGrpSpPr>
+        <p:cNvPr id="1" name=""/>
+        <p:cNvGrpSpPr/>
+        <p:nvPr/>
+      </p:nvGrpSpPr>
+      <p:grpSpPr>
+        <a:xfrm>
+          <a:off x="0" y="0"/>
+          <a:ext cx="0" cy="0"/>
+          <a:chOff x="0" y="0"/>
+          <a:chExt cx="0" cy="0"/>
+        </a:xfrm>
+      </p:grpSpPr>
+      <p:sp>
+        <p:nvSpPr>
+          <p:cNvPr id="2" name="Título 1">
+            <a:extLst>
+              <a:ext uri="{FF2B5EF4-FFF2-40B4-BE49-F238E27FC236}">
+                <a16:creationId xmlns:a16="http://schemas.microsoft.com/office/drawing/2014/main" id="{E95E3CAA-56B7-4354-B6A9-0E495B0D96A5}"/>
+              </a:ext>
+            </a:extLst>
+          </p:cNvPr>
+          <p:cNvSpPr>
+            <a:spLocks noGrp="1"/>
+          </p:cNvSpPr>
+          <p:nvPr>
+            <p:ph type="title"/>
+          </p:nvPr>
+        </p:nvSpPr>
+        <p:spPr>
+          <a:xfrm>
+            <a:off x="1141412" y="618518"/>
+            <a:ext cx="10250487" cy="1478570"/>
+          </a:xfrm>
+        </p:spPr>
+        <p:txBody>
+          <a:bodyPr>
+            <a:normAutofit/>
+          </a:bodyPr>
+          <a:lstStyle/>
+          <a:p>
+            <a:r>
+              <a:rPr lang="pt-BR" sz="2800" dirty="0"/>
+              <a:t>Depois de alteramos o </a:t>
+            </a:r>
+            <a:r>
+              <a:rPr lang="pt-BR" sz="2800" dirty="0" err="1"/>
+              <a:t>kp</a:t>
+            </a:r>
+            <a:r>
+              <a:rPr lang="pt-BR" sz="2800" dirty="0"/>
+              <a:t> e o ki até que se encontre uma saída que esteja dentro da tolerância pedida, com isso temos um novo </a:t>
+            </a:r>
+            <a:r>
+              <a:rPr lang="pt-BR" sz="2800" dirty="0" err="1"/>
+              <a:t>kp</a:t>
+            </a:r>
+            <a:r>
+              <a:rPr lang="pt-BR" sz="2800" dirty="0"/>
+              <a:t> de:</a:t>
+            </a:r>
+          </a:p>
+        </p:txBody>
+      </p:sp>
+      <p:sp>
+        <p:nvSpPr>
+          <p:cNvPr id="3" name="Espaço Reservado para Conteúdo 2">
+            <a:extLst>
+              <a:ext uri="{FF2B5EF4-FFF2-40B4-BE49-F238E27FC236}">
+                <a16:creationId xmlns:a16="http://schemas.microsoft.com/office/drawing/2014/main" id="{FF62894C-75D9-4285-B15C-EC264C770A3B}"/>
+              </a:ext>
+            </a:extLst>
+          </p:cNvPr>
+          <p:cNvSpPr>
+            <a:spLocks noGrp="1"/>
+          </p:cNvSpPr>
+          <p:nvPr>
+            <p:ph idx="1"/>
+          </p:nvPr>
+        </p:nvSpPr>
+        <p:spPr/>
+        <p:txBody>
+          <a:bodyPr/>
+          <a:lstStyle/>
+          <a:p>
+            <a:pPr marL="0" indent="0">
+              <a:buNone/>
+            </a:pPr>
+            <a:r>
+              <a:rPr lang="pt-BR" sz="3200" dirty="0"/>
+              <a:t>Resultado</a:t>
+            </a:r>
+            <a:r>
+              <a:rPr lang="pt-BR" dirty="0"/>
+              <a:t>:</a:t>
+            </a:r>
+          </a:p>
+          <a:p>
+            <a:pPr marL="0" indent="0">
+              <a:buNone/>
+            </a:pPr>
+            <a:r>
+              <a:rPr lang="pt-BR" dirty="0" err="1"/>
+              <a:t>Kp</a:t>
+            </a:r>
+            <a:r>
+              <a:rPr lang="pt-BR" dirty="0"/>
+              <a:t>: 2,8</a:t>
+            </a:r>
+          </a:p>
+        </p:txBody>
+      </p:sp>
+    </p:spTree>
+    <p:extLst>
+      <p:ext uri="{BB962C8B-B14F-4D97-AF65-F5344CB8AC3E}">
+        <p14:creationId xmlns:p14="http://schemas.microsoft.com/office/powerpoint/2010/main" val="3490320744"/>
+      </p:ext>
+    </p:extLst>
+  </p:cSld>
+  <p:clrMapOvr>
+    <a:masterClrMapping/>
+  </p:clrMapOvr>
+</p:sld>
+</file>
+
+<file path=ppt/slides/slide11.xml><?xml version="1.0" encoding="utf-8"?>
 <p:sld xmlns:a="http://schemas.openxmlformats.org/drawingml/2006/main" xmlns:r="http://schemas.openxmlformats.org/officeDocument/2006/relationships" xmlns:p="http://schemas.openxmlformats.org/presentationml/2006/main">
   <p:cSld>
     <p:spTree>
@@ -13147,7 +13441,7 @@
           <p:cNvPr id="2" name="Title 1">
             <a:extLst>
               <a:ext uri="{FF2B5EF4-FFF2-40B4-BE49-F238E27FC236}">
-                <a16:creationId xmlns:a16="http://schemas.microsoft.com/office/drawing/2014/main" id="{9C46B880-CA4C-DB57-71CA-807731F0E7D1}"/>
+                <a16:creationId xmlns:a16="http://schemas.microsoft.com/office/drawing/2014/main" id="{8E65709B-49DD-8F12-0222-22E0521CB14E}"/>
               </a:ext>
             </a:extLst>
           </p:cNvPr>
@@ -13160,24 +13454,42 @@
         </p:nvSpPr>
         <p:spPr/>
         <p:txBody>
-          <a:bodyPr/>
+          <a:bodyPr>
+            <a:normAutofit/>
+          </a:bodyPr>
           <a:lstStyle/>
           <a:p>
             <a:r>
+              <a:rPr lang="en-US" dirty="0" err="1"/>
+              <a:t>Gráfico</a:t>
+            </a:r>
+            <a:r>
               <a:rPr lang="en-US" dirty="0"/>
-              <a:t>Set point y1 </a:t>
+              <a:t> para o Maximo de </a:t>
             </a:r>
             <a:r>
               <a:rPr lang="en-US" dirty="0" err="1"/>
-              <a:t>malha</a:t>
+              <a:t>pico</a:t>
             </a:r>
             <a:r>
               <a:rPr lang="en-US" dirty="0"/>
-              <a:t> </a:t>
+              <a:t> e tempo de </a:t>
             </a:r>
             <a:r>
               <a:rPr lang="en-US" dirty="0" err="1"/>
-              <a:t>aberta</a:t>
+              <a:t>acomodação</a:t>
+            </a:r>
+            <a:r>
+              <a:rPr lang="en-US" dirty="0"/>
+              <a:t> novo, </a:t>
+            </a:r>
+            <a:r>
+              <a:rPr lang="en-US" dirty="0" err="1"/>
+              <a:t>kp</a:t>
+            </a:r>
+            <a:r>
+              <a:rPr lang="en-US" dirty="0"/>
+              <a:t>= 2,8</a:t>
             </a:r>
           </a:p>
         </p:txBody>
@@ -13187,7 +13499,7 @@
           <p:cNvPr id="4" name="Picture 4" descr="Chart, line chart&#10;&#10;Description automatically generated">
             <a:extLst>
               <a:ext uri="{FF2B5EF4-FFF2-40B4-BE49-F238E27FC236}">
-                <a16:creationId xmlns:a16="http://schemas.microsoft.com/office/drawing/2014/main" id="{02943A2A-30B6-5C36-FC5E-F806BED72F43}"/>
+                <a16:creationId xmlns:a16="http://schemas.microsoft.com/office/drawing/2014/main" id="{F26630D5-88F7-E7E9-1BA1-5294B7F3C4C4}"/>
               </a:ext>
             </a:extLst>
           </p:cNvPr>
@@ -13206,15 +13518,15 @@
         </p:blipFill>
         <p:spPr>
           <a:xfrm>
-            <a:off x="4726022" y="2249487"/>
-            <a:ext cx="2736779" cy="3541714"/>
+            <a:off x="3158276" y="2697768"/>
+            <a:ext cx="5872272" cy="3541714"/>
           </a:xfrm>
         </p:spPr>
       </p:pic>
     </p:spTree>
     <p:extLst>
       <p:ext uri="{BB962C8B-B14F-4D97-AF65-F5344CB8AC3E}">
-        <p14:creationId xmlns:p14="http://schemas.microsoft.com/office/powerpoint/2010/main" val="4254428302"/>
+        <p14:creationId xmlns:p14="http://schemas.microsoft.com/office/powerpoint/2010/main" val="2360092736"/>
       </p:ext>
     </p:extLst>
   </p:cSld>
@@ -13224,7 +13536,7 @@
 </p:sld>
 </file>
 
-<file path=ppt/slides/slide3.xml><?xml version="1.0" encoding="utf-8"?>
+<file path=ppt/slides/slide2.xml><?xml version="1.0" encoding="utf-8"?>
 <p:sld xmlns:a="http://schemas.openxmlformats.org/drawingml/2006/main" xmlns:r="http://schemas.openxmlformats.org/officeDocument/2006/relationships" xmlns:p="http://schemas.openxmlformats.org/presentationml/2006/main">
   <p:cSld>
     <p:spTree>
@@ -13257,15 +13569,25 @@
             <p:ph type="title"/>
           </p:nvPr>
         </p:nvSpPr>
-        <p:spPr/>
+        <p:spPr>
+          <a:xfrm>
+            <a:off x="1141413" y="1675479"/>
+            <a:ext cx="3303587" cy="1248382"/>
+          </a:xfrm>
+        </p:spPr>
         <p:txBody>
-          <a:bodyPr/>
+          <a:bodyPr>
+            <a:normAutofit/>
+          </a:bodyPr>
           <a:lstStyle/>
           <a:p>
             <a:r>
               <a:rPr lang="en-US" dirty="0"/>
-              <a:t>Set point x1 </a:t>
-            </a:r>
+              <a:t>Set point X1 </a:t>
+            </a:r>
+            <a:br>
+              <a:rPr lang="en-US" dirty="0"/>
+            </a:br>
             <a:r>
               <a:rPr lang="en-US" dirty="0" err="1"/>
               <a:t>malha</a:t>
@@ -13278,6 +13600,7 @@
               <a:rPr lang="en-US" dirty="0" err="1"/>
               <a:t>aberta</a:t>
             </a:r>
+            <a:endParaRPr lang="en-US" dirty="0"/>
           </a:p>
         </p:txBody>
       </p:sp>
@@ -13305,11 +13628,162 @@
         </p:blipFill>
         <p:spPr>
           <a:xfrm>
-            <a:off x="4726022" y="2249487"/>
-            <a:ext cx="2736779" cy="3541714"/>
+            <a:off x="1141413" y="2923862"/>
+            <a:ext cx="3707657" cy="3475848"/>
           </a:xfrm>
         </p:spPr>
       </p:pic>
+      <p:pic>
+        <p:nvPicPr>
+          <p:cNvPr id="5" name="Picture 4" descr="Chart, line chart&#10;&#10;Description automatically generated">
+            <a:extLst>
+              <a:ext uri="{FF2B5EF4-FFF2-40B4-BE49-F238E27FC236}">
+                <a16:creationId xmlns:a16="http://schemas.microsoft.com/office/drawing/2014/main" id="{39373D9C-83AA-4888-9F14-E8CE88C92B1C}"/>
+              </a:ext>
+            </a:extLst>
+          </p:cNvPr>
+          <p:cNvPicPr>
+            <a:picLocks noChangeAspect="1"/>
+          </p:cNvPicPr>
+          <p:nvPr/>
+        </p:nvPicPr>
+        <p:blipFill>
+          <a:blip r:embed="rId3"/>
+          <a:stretch>
+            <a:fillRect/>
+          </a:stretch>
+        </p:blipFill>
+        <p:spPr>
+          <a:xfrm>
+            <a:off x="6661931" y="2923862"/>
+            <a:ext cx="3707658" cy="3475848"/>
+          </a:xfrm>
+          <a:prstGeom prst="rect">
+            <a:avLst/>
+          </a:prstGeom>
+        </p:spPr>
+      </p:pic>
+      <p:sp>
+        <p:nvSpPr>
+          <p:cNvPr id="7" name="Title 1">
+            <a:extLst>
+              <a:ext uri="{FF2B5EF4-FFF2-40B4-BE49-F238E27FC236}">
+                <a16:creationId xmlns:a16="http://schemas.microsoft.com/office/drawing/2014/main" id="{81136CEB-085D-4362-8F1E-15292C6B9264}"/>
+              </a:ext>
+            </a:extLst>
+          </p:cNvPr>
+          <p:cNvSpPr txBox="1">
+            <a:spLocks/>
+          </p:cNvSpPr>
+          <p:nvPr/>
+        </p:nvSpPr>
+        <p:spPr>
+          <a:xfrm>
+            <a:off x="7041069" y="1675479"/>
+            <a:ext cx="3303587" cy="1362682"/>
+          </a:xfrm>
+          <a:prstGeom prst="rect">
+            <a:avLst/>
+          </a:prstGeom>
+        </p:spPr>
+        <p:txBody>
+          <a:bodyPr vert="horz" lIns="91440" tIns="45720" rIns="91440" bIns="45720" rtlCol="0" anchor="ctr">
+            <a:normAutofit/>
+          </a:bodyPr>
+          <a:lstStyle>
+            <a:lvl1pPr algn="l" defTabSz="914400" rtl="0" eaLnBrk="1" latinLnBrk="0" hangingPunct="1">
+              <a:lnSpc>
+                <a:spcPct val="90000"/>
+              </a:lnSpc>
+              <a:spcBef>
+                <a:spcPct val="0"/>
+              </a:spcBef>
+              <a:buNone/>
+              <a:defRPr sz="3600" kern="1200" cap="all" baseline="0">
+                <a:solidFill>
+                  <a:schemeClr val="tx1"/>
+                </a:solidFill>
+                <a:latin typeface="+mj-lt"/>
+                <a:ea typeface="+mj-ea"/>
+                <a:cs typeface="+mj-cs"/>
+              </a:defRPr>
+            </a:lvl1pPr>
+          </a:lstStyle>
+          <a:p>
+            <a:r>
+              <a:rPr lang="en-US" dirty="0"/>
+              <a:t>Set point y1 </a:t>
+            </a:r>
+            <a:r>
+              <a:rPr lang="en-US" dirty="0" err="1"/>
+              <a:t>malha</a:t>
+            </a:r>
+            <a:r>
+              <a:rPr lang="en-US" dirty="0"/>
+              <a:t> </a:t>
+            </a:r>
+            <a:r>
+              <a:rPr lang="en-US" dirty="0" err="1"/>
+              <a:t>aberta</a:t>
+            </a:r>
+            <a:endParaRPr lang="en-US" dirty="0"/>
+          </a:p>
+        </p:txBody>
+      </p:sp>
+      <p:sp>
+        <p:nvSpPr>
+          <p:cNvPr id="8" name="Título 1">
+            <a:extLst>
+              <a:ext uri="{FF2B5EF4-FFF2-40B4-BE49-F238E27FC236}">
+                <a16:creationId xmlns:a16="http://schemas.microsoft.com/office/drawing/2014/main" id="{201059D2-F7F3-4A2A-BEE5-A17D89F4CD38}"/>
+              </a:ext>
+            </a:extLst>
+          </p:cNvPr>
+          <p:cNvSpPr txBox="1">
+            <a:spLocks/>
+          </p:cNvSpPr>
+          <p:nvPr/>
+        </p:nvSpPr>
+        <p:spPr>
+          <a:xfrm>
+            <a:off x="918165" y="458291"/>
+            <a:ext cx="10355669" cy="1478570"/>
+          </a:xfrm>
+          <a:prstGeom prst="rect">
+            <a:avLst/>
+          </a:prstGeom>
+        </p:spPr>
+        <p:txBody>
+          <a:bodyPr vert="horz" lIns="91440" tIns="45720" rIns="91440" bIns="45720" rtlCol="0" anchor="ctr">
+            <a:normAutofit/>
+          </a:bodyPr>
+          <a:lstStyle>
+            <a:lvl1pPr algn="l" defTabSz="914400" rtl="0" eaLnBrk="1" latinLnBrk="0" hangingPunct="1">
+              <a:lnSpc>
+                <a:spcPct val="90000"/>
+              </a:lnSpc>
+              <a:spcBef>
+                <a:spcPct val="0"/>
+              </a:spcBef>
+              <a:buNone/>
+              <a:defRPr sz="3600" kern="1200" cap="all" baseline="0">
+                <a:solidFill>
+                  <a:schemeClr val="tx1"/>
+                </a:solidFill>
+                <a:latin typeface="+mj-lt"/>
+                <a:ea typeface="+mj-ea"/>
+                <a:cs typeface="+mj-cs"/>
+              </a:defRPr>
+            </a:lvl1pPr>
+          </a:lstStyle>
+          <a:p>
+            <a:r>
+              <a:rPr lang="pt-BR" cap="none" dirty="0"/>
+              <a:t>Os dados de entrada foram plotados em malha aberta</a:t>
+            </a:r>
+          </a:p>
+        </p:txBody>
+      </p:sp>
     </p:spTree>
     <p:extLst>
       <p:ext uri="{BB962C8B-B14F-4D97-AF65-F5344CB8AC3E}">
@@ -13323,7 +13797,7 @@
 </p:sld>
 </file>
 
-<file path=ppt/slides/slide4.xml><?xml version="1.0" encoding="utf-8"?>
+<file path=ppt/slides/slide3.xml><?xml version="1.0" encoding="utf-8"?>
 <p:sld xmlns:a="http://schemas.openxmlformats.org/drawingml/2006/main" xmlns:r="http://schemas.openxmlformats.org/officeDocument/2006/relationships" xmlns:p="http://schemas.openxmlformats.org/presentationml/2006/main">
   <p:cSld>
     <p:spTree>
@@ -13389,6 +13863,7 @@
               <a:rPr lang="en-US" dirty="0" err="1"/>
               <a:t>aberta</a:t>
             </a:r>
+            <a:endParaRPr lang="en-US" dirty="0"/>
           </a:p>
         </p:txBody>
       </p:sp>
@@ -13416,15 +13891,225 @@
         </p:blipFill>
         <p:spPr>
           <a:xfrm>
-            <a:off x="4726022" y="2249487"/>
-            <a:ext cx="2736779" cy="3541714"/>
+            <a:off x="5702300" y="2165585"/>
+            <a:ext cx="4608513" cy="4073897"/>
           </a:xfrm>
         </p:spPr>
       </p:pic>
+      <p:sp>
+        <p:nvSpPr>
+          <p:cNvPr id="5" name="CaixaDeTexto 4">
+            <a:extLst>
+              <a:ext uri="{FF2B5EF4-FFF2-40B4-BE49-F238E27FC236}">
+                <a16:creationId xmlns:a16="http://schemas.microsoft.com/office/drawing/2014/main" id="{840B1D34-D772-499A-B6C3-C08A55312C83}"/>
+              </a:ext>
+            </a:extLst>
+          </p:cNvPr>
+          <p:cNvSpPr txBox="1"/>
+          <p:nvPr/>
+        </p:nvSpPr>
+        <p:spPr>
+          <a:xfrm>
+            <a:off x="1141412" y="2097088"/>
+            <a:ext cx="3887788" cy="954107"/>
+          </a:xfrm>
+          <a:prstGeom prst="rect">
+            <a:avLst/>
+          </a:prstGeom>
+          <a:noFill/>
+        </p:spPr>
+        <p:txBody>
+          <a:bodyPr wrap="square" rtlCol="0">
+            <a:spAutoFit/>
+          </a:bodyPr>
+          <a:lstStyle/>
+          <a:p>
+            <a:r>
+              <a:rPr lang="pt-BR" sz="2800" dirty="0"/>
+              <a:t>Função de transferência:</a:t>
+            </a:r>
+          </a:p>
+          <a:p>
+            <a:r>
+              <a:rPr lang="pt-BR" sz="2800" dirty="0"/>
+              <a:t>0,1714/(s+0,07143)</a:t>
+            </a:r>
+          </a:p>
+        </p:txBody>
+      </p:sp>
+      <p:sp>
+        <p:nvSpPr>
+          <p:cNvPr id="6" name="CaixaDeTexto 5">
+            <a:extLst>
+              <a:ext uri="{FF2B5EF4-FFF2-40B4-BE49-F238E27FC236}">
+                <a16:creationId xmlns:a16="http://schemas.microsoft.com/office/drawing/2014/main" id="{2C7554B4-AEF6-4759-B5CF-10E311E87E60}"/>
+              </a:ext>
+            </a:extLst>
+          </p:cNvPr>
+          <p:cNvSpPr txBox="1"/>
+          <p:nvPr/>
+        </p:nvSpPr>
+        <p:spPr>
+          <a:xfrm>
+            <a:off x="1144590" y="3429000"/>
+            <a:ext cx="2736779" cy="954107"/>
+          </a:xfrm>
+          <a:prstGeom prst="rect">
+            <a:avLst/>
+          </a:prstGeom>
+          <a:noFill/>
+        </p:spPr>
+        <p:txBody>
+          <a:bodyPr wrap="square" rtlCol="0">
+            <a:spAutoFit/>
+          </a:bodyPr>
+          <a:lstStyle/>
+          <a:p>
+            <a:r>
+              <a:rPr lang="pt-BR" sz="2800" dirty="0"/>
+              <a:t>Forma Canônica:</a:t>
+            </a:r>
+          </a:p>
+          <a:p>
+            <a:r>
+              <a:rPr lang="pt-BR" sz="2800" dirty="0"/>
+              <a:t>2,4/(14s + 1)</a:t>
+            </a:r>
+          </a:p>
+        </p:txBody>
+      </p:sp>
     </p:spTree>
     <p:extLst>
       <p:ext uri="{BB962C8B-B14F-4D97-AF65-F5344CB8AC3E}">
         <p14:creationId xmlns:p14="http://schemas.microsoft.com/office/powerpoint/2010/main" val="779202726"/>
+      </p:ext>
+    </p:extLst>
+  </p:cSld>
+  <p:clrMapOvr>
+    <a:masterClrMapping/>
+  </p:clrMapOvr>
+</p:sld>
+</file>
+
+<file path=ppt/slides/slide4.xml><?xml version="1.0" encoding="utf-8"?>
+<p:sld xmlns:a="http://schemas.openxmlformats.org/drawingml/2006/main" xmlns:r="http://schemas.openxmlformats.org/officeDocument/2006/relationships" xmlns:p="http://schemas.openxmlformats.org/presentationml/2006/main">
+  <p:cSld>
+    <p:spTree>
+      <p:nvGrpSpPr>
+        <p:cNvPr id="1" name=""/>
+        <p:cNvGrpSpPr/>
+        <p:nvPr/>
+      </p:nvGrpSpPr>
+      <p:grpSpPr>
+        <a:xfrm>
+          <a:off x="0" y="0"/>
+          <a:ext cx="0" cy="0"/>
+          <a:chOff x="0" y="0"/>
+          <a:chExt cx="0" cy="0"/>
+        </a:xfrm>
+      </p:grpSpPr>
+      <p:sp>
+        <p:nvSpPr>
+          <p:cNvPr id="2" name="Título 1">
+            <a:extLst>
+              <a:ext uri="{FF2B5EF4-FFF2-40B4-BE49-F238E27FC236}">
+                <a16:creationId xmlns:a16="http://schemas.microsoft.com/office/drawing/2014/main" id="{EA1DC914-89C9-4650-BD9D-3D3E58324974}"/>
+              </a:ext>
+            </a:extLst>
+          </p:cNvPr>
+          <p:cNvSpPr>
+            <a:spLocks noGrp="1"/>
+          </p:cNvSpPr>
+          <p:nvPr>
+            <p:ph type="title"/>
+          </p:nvPr>
+        </p:nvSpPr>
+        <p:spPr/>
+        <p:txBody>
+          <a:bodyPr/>
+          <a:lstStyle/>
+          <a:p>
+            <a:r>
+              <a:rPr lang="pt-BR" dirty="0"/>
+              <a:t>função de realimentação com degrau unitário para encontrar a malha fechada</a:t>
+            </a:r>
+          </a:p>
+        </p:txBody>
+      </p:sp>
+      <p:sp>
+        <p:nvSpPr>
+          <p:cNvPr id="4" name="CaixaDeTexto 3">
+            <a:extLst>
+              <a:ext uri="{FF2B5EF4-FFF2-40B4-BE49-F238E27FC236}">
+                <a16:creationId xmlns:a16="http://schemas.microsoft.com/office/drawing/2014/main" id="{C245C4D5-CF76-41DD-B074-42F20BCD6AD8}"/>
+              </a:ext>
+            </a:extLst>
+          </p:cNvPr>
+          <p:cNvSpPr txBox="1"/>
+          <p:nvPr/>
+        </p:nvSpPr>
+        <p:spPr>
+          <a:xfrm>
+            <a:off x="1141413" y="3285477"/>
+            <a:ext cx="2826329" cy="584775"/>
+          </a:xfrm>
+          <a:prstGeom prst="rect">
+            <a:avLst/>
+          </a:prstGeom>
+          <a:noFill/>
+        </p:spPr>
+        <p:txBody>
+          <a:bodyPr wrap="square" rtlCol="0">
+            <a:spAutoFit/>
+          </a:bodyPr>
+          <a:lstStyle/>
+          <a:p>
+            <a:r>
+              <a:rPr lang="pt-BR" sz="3200" dirty="0"/>
+              <a:t>2,4/(14s + 3,4)</a:t>
+            </a:r>
+          </a:p>
+        </p:txBody>
+      </p:sp>
+      <p:sp>
+        <p:nvSpPr>
+          <p:cNvPr id="7" name="CaixaDeTexto 6">
+            <a:extLst>
+              <a:ext uri="{FF2B5EF4-FFF2-40B4-BE49-F238E27FC236}">
+                <a16:creationId xmlns:a16="http://schemas.microsoft.com/office/drawing/2014/main" id="{5AA6D89E-F3B3-4E66-97B2-993078FD5A27}"/>
+              </a:ext>
+            </a:extLst>
+          </p:cNvPr>
+          <p:cNvSpPr txBox="1"/>
+          <p:nvPr/>
+        </p:nvSpPr>
+        <p:spPr>
+          <a:xfrm>
+            <a:off x="1141413" y="2368117"/>
+            <a:ext cx="2056076" cy="646331"/>
+          </a:xfrm>
+          <a:prstGeom prst="rect">
+            <a:avLst/>
+          </a:prstGeom>
+          <a:noFill/>
+        </p:spPr>
+        <p:txBody>
+          <a:bodyPr wrap="none" rtlCol="0">
+            <a:spAutoFit/>
+          </a:bodyPr>
+          <a:lstStyle/>
+          <a:p>
+            <a:r>
+              <a:rPr lang="pt-BR" sz="3600" dirty="0"/>
+              <a:t>Resultado:</a:t>
+            </a:r>
+          </a:p>
+        </p:txBody>
+      </p:sp>
+    </p:spTree>
+    <p:extLst>
+      <p:ext uri="{BB962C8B-B14F-4D97-AF65-F5344CB8AC3E}">
+        <p14:creationId xmlns:p14="http://schemas.microsoft.com/office/powerpoint/2010/main" val="1244225070"/>
       </p:ext>
     </p:extLst>
   </p:cSld>
@@ -13467,7 +14152,12 @@
             <p:ph type="title"/>
           </p:nvPr>
         </p:nvSpPr>
-        <p:spPr/>
+        <p:spPr>
+          <a:xfrm>
+            <a:off x="1141413" y="618518"/>
+            <a:ext cx="10413278" cy="1478570"/>
+          </a:xfrm>
+        </p:spPr>
         <p:txBody>
           <a:bodyPr>
             <a:normAutofit/>
@@ -13541,8 +14231,8 @@
         </p:blipFill>
         <p:spPr>
           <a:xfrm>
-            <a:off x="4726022" y="2249487"/>
-            <a:ext cx="2736779" cy="3541714"/>
+            <a:off x="4489684" y="2086068"/>
+            <a:ext cx="3209456" cy="4153414"/>
           </a:xfrm>
         </p:spPr>
       </p:pic>
@@ -13560,6 +14250,355 @@
 </file>
 
 <file path=ppt/slides/slide6.xml><?xml version="1.0" encoding="utf-8"?>
+<p:sld xmlns:a="http://schemas.openxmlformats.org/drawingml/2006/main" xmlns:r="http://schemas.openxmlformats.org/officeDocument/2006/relationships" xmlns:p="http://schemas.openxmlformats.org/presentationml/2006/main">
+  <p:cSld>
+    <p:spTree>
+      <p:nvGrpSpPr>
+        <p:cNvPr id="1" name=""/>
+        <p:cNvGrpSpPr/>
+        <p:nvPr/>
+      </p:nvGrpSpPr>
+      <p:grpSpPr>
+        <a:xfrm>
+          <a:off x="0" y="0"/>
+          <a:ext cx="0" cy="0"/>
+          <a:chOff x="0" y="0"/>
+          <a:chExt cx="0" cy="0"/>
+        </a:xfrm>
+      </p:grpSpPr>
+      <p:sp>
+        <p:nvSpPr>
+          <p:cNvPr id="2" name="Título 1">
+            <a:extLst>
+              <a:ext uri="{FF2B5EF4-FFF2-40B4-BE49-F238E27FC236}">
+                <a16:creationId xmlns:a16="http://schemas.microsoft.com/office/drawing/2014/main" id="{D5596E2E-C6F5-477C-A6D2-954DDAB9A706}"/>
+              </a:ext>
+            </a:extLst>
+          </p:cNvPr>
+          <p:cNvSpPr>
+            <a:spLocks noGrp="1"/>
+          </p:cNvSpPr>
+          <p:nvPr>
+            <p:ph type="title"/>
+          </p:nvPr>
+        </p:nvSpPr>
+        <p:spPr/>
+        <p:txBody>
+          <a:bodyPr/>
+          <a:lstStyle/>
+          <a:p>
+            <a:r>
+              <a:rPr lang="pt-BR" dirty="0"/>
+              <a:t>Com esses valores e também com o A1 e B1 encontrados</a:t>
+            </a:r>
+          </a:p>
+        </p:txBody>
+      </p:sp>
+      <p:sp>
+        <p:nvSpPr>
+          <p:cNvPr id="3" name="Espaço Reservado para Conteúdo 2">
+            <a:extLst>
+              <a:ext uri="{FF2B5EF4-FFF2-40B4-BE49-F238E27FC236}">
+                <a16:creationId xmlns:a16="http://schemas.microsoft.com/office/drawing/2014/main" id="{B4662586-B407-4E84-9B73-065AFC4B2DE9}"/>
+              </a:ext>
+            </a:extLst>
+          </p:cNvPr>
+          <p:cNvSpPr>
+            <a:spLocks noGrp="1"/>
+          </p:cNvSpPr>
+          <p:nvPr>
+            <p:ph idx="1"/>
+          </p:nvPr>
+        </p:nvSpPr>
+        <p:spPr>
+          <a:xfrm>
+            <a:off x="1141413" y="2249487"/>
+            <a:ext cx="2541588" cy="2119313"/>
+          </a:xfrm>
+        </p:spPr>
+        <p:txBody>
+          <a:bodyPr>
+            <a:normAutofit/>
+          </a:bodyPr>
+          <a:lstStyle/>
+          <a:p>
+            <a:pPr marL="0" indent="0">
+              <a:buNone/>
+            </a:pPr>
+            <a:r>
+              <a:rPr lang="pt-BR" sz="2800" dirty="0"/>
+              <a:t>Valores:</a:t>
+            </a:r>
+          </a:p>
+          <a:p>
+            <a:pPr marL="0" indent="0">
+              <a:buNone/>
+            </a:pPr>
+            <a:r>
+              <a:rPr lang="pt-BR" sz="2800" dirty="0"/>
+              <a:t>A1: 0,9929</a:t>
+            </a:r>
+          </a:p>
+          <a:p>
+            <a:pPr marL="0" indent="0">
+              <a:buNone/>
+            </a:pPr>
+            <a:r>
+              <a:rPr lang="pt-BR" sz="2800" dirty="0"/>
+              <a:t>B1: 0,017082</a:t>
+            </a:r>
+          </a:p>
+        </p:txBody>
+      </p:sp>
+    </p:spTree>
+    <p:extLst>
+      <p:ext uri="{BB962C8B-B14F-4D97-AF65-F5344CB8AC3E}">
+        <p14:creationId xmlns:p14="http://schemas.microsoft.com/office/powerpoint/2010/main" val="2863702943"/>
+      </p:ext>
+    </p:extLst>
+  </p:cSld>
+  <p:clrMapOvr>
+    <a:masterClrMapping/>
+  </p:clrMapOvr>
+</p:sld>
+</file>
+
+<file path=ppt/slides/slide7.xml><?xml version="1.0" encoding="utf-8"?>
+<p:sld xmlns:a="http://schemas.openxmlformats.org/drawingml/2006/main" xmlns:r="http://schemas.openxmlformats.org/officeDocument/2006/relationships" xmlns:p="http://schemas.openxmlformats.org/presentationml/2006/main">
+  <p:cSld>
+    <p:spTree>
+      <p:nvGrpSpPr>
+        <p:cNvPr id="1" name=""/>
+        <p:cNvGrpSpPr/>
+        <p:nvPr/>
+      </p:nvGrpSpPr>
+      <p:grpSpPr>
+        <a:xfrm>
+          <a:off x="0" y="0"/>
+          <a:ext cx="0" cy="0"/>
+          <a:chOff x="0" y="0"/>
+          <a:chExt cx="0" cy="0"/>
+        </a:xfrm>
+      </p:grpSpPr>
+      <p:sp>
+        <p:nvSpPr>
+          <p:cNvPr id="2" name="Título 1">
+            <a:extLst>
+              <a:ext uri="{FF2B5EF4-FFF2-40B4-BE49-F238E27FC236}">
+                <a16:creationId xmlns:a16="http://schemas.microsoft.com/office/drawing/2014/main" id="{CFBBCC0B-7CC0-47F9-B2C7-21A857A24976}"/>
+              </a:ext>
+            </a:extLst>
+          </p:cNvPr>
+          <p:cNvSpPr>
+            <a:spLocks noGrp="1"/>
+          </p:cNvSpPr>
+          <p:nvPr>
+            <p:ph type="title"/>
+          </p:nvPr>
+        </p:nvSpPr>
+        <p:spPr>
+          <a:xfrm>
+            <a:off x="854867" y="770917"/>
+            <a:ext cx="10479087" cy="1478570"/>
+          </a:xfrm>
+        </p:spPr>
+        <p:txBody>
+          <a:bodyPr>
+            <a:normAutofit/>
+          </a:bodyPr>
+          <a:lstStyle/>
+          <a:p>
+            <a:r>
+              <a:rPr lang="pt-BR" sz="3100" dirty="0"/>
+              <a:t>Conseguimos encontrar nosso </a:t>
+            </a:r>
+            <a:r>
+              <a:rPr lang="pt-BR" sz="3100" dirty="0" err="1"/>
+              <a:t>kp</a:t>
+            </a:r>
+            <a:r>
+              <a:rPr lang="pt-BR" sz="3100" dirty="0"/>
+              <a:t> e ki que foi de:</a:t>
+            </a:r>
+            <a:br>
+              <a:rPr lang="pt-BR" dirty="0"/>
+            </a:br>
+            <a:endParaRPr lang="pt-BR" dirty="0"/>
+          </a:p>
+        </p:txBody>
+      </p:sp>
+      <p:sp>
+        <p:nvSpPr>
+          <p:cNvPr id="3" name="Espaço Reservado para Conteúdo 2">
+            <a:extLst>
+              <a:ext uri="{FF2B5EF4-FFF2-40B4-BE49-F238E27FC236}">
+                <a16:creationId xmlns:a16="http://schemas.microsoft.com/office/drawing/2014/main" id="{D86424C4-9703-4D93-BC1A-359388C72A6B}"/>
+              </a:ext>
+            </a:extLst>
+          </p:cNvPr>
+          <p:cNvSpPr>
+            <a:spLocks noGrp="1"/>
+          </p:cNvSpPr>
+          <p:nvPr>
+            <p:ph idx="1"/>
+          </p:nvPr>
+        </p:nvSpPr>
+        <p:spPr/>
+        <p:txBody>
+          <a:bodyPr>
+            <a:normAutofit/>
+          </a:bodyPr>
+          <a:lstStyle/>
+          <a:p>
+            <a:pPr marL="0" indent="0">
+              <a:buNone/>
+            </a:pPr>
+            <a:r>
+              <a:rPr lang="pt-BR" sz="3200" dirty="0" err="1"/>
+              <a:t>Kp</a:t>
+            </a:r>
+            <a:r>
+              <a:rPr lang="pt-BR" sz="3200" dirty="0"/>
+              <a:t>: 1,9167</a:t>
+            </a:r>
+            <a:br>
+              <a:rPr lang="pt-BR" sz="3200" dirty="0"/>
+            </a:br>
+            <a:r>
+              <a:rPr lang="pt-BR" sz="3200" dirty="0"/>
+              <a:t>Ki: 0,8732</a:t>
+            </a:r>
+          </a:p>
+        </p:txBody>
+      </p:sp>
+    </p:spTree>
+    <p:extLst>
+      <p:ext uri="{BB962C8B-B14F-4D97-AF65-F5344CB8AC3E}">
+        <p14:creationId xmlns:p14="http://schemas.microsoft.com/office/powerpoint/2010/main" val="3283740535"/>
+      </p:ext>
+    </p:extLst>
+  </p:cSld>
+  <p:clrMapOvr>
+    <a:masterClrMapping/>
+  </p:clrMapOvr>
+</p:sld>
+</file>
+
+<file path=ppt/slides/slide8.xml><?xml version="1.0" encoding="utf-8"?>
+<p:sld xmlns:a="http://schemas.openxmlformats.org/drawingml/2006/main" xmlns:r="http://schemas.openxmlformats.org/officeDocument/2006/relationships" xmlns:p="http://schemas.openxmlformats.org/presentationml/2006/main">
+  <p:cSld>
+    <p:spTree>
+      <p:nvGrpSpPr>
+        <p:cNvPr id="1" name=""/>
+        <p:cNvGrpSpPr/>
+        <p:nvPr/>
+      </p:nvGrpSpPr>
+      <p:grpSpPr>
+        <a:xfrm>
+          <a:off x="0" y="0"/>
+          <a:ext cx="0" cy="0"/>
+          <a:chOff x="0" y="0"/>
+          <a:chExt cx="0" cy="0"/>
+        </a:xfrm>
+      </p:grpSpPr>
+      <p:sp>
+        <p:nvSpPr>
+          <p:cNvPr id="2" name="Título 1">
+            <a:extLst>
+              <a:ext uri="{FF2B5EF4-FFF2-40B4-BE49-F238E27FC236}">
+                <a16:creationId xmlns:a16="http://schemas.microsoft.com/office/drawing/2014/main" id="{0F8F840B-8C07-4CC2-A738-A7BE1C892651}"/>
+              </a:ext>
+            </a:extLst>
+          </p:cNvPr>
+          <p:cNvSpPr>
+            <a:spLocks noGrp="1"/>
+          </p:cNvSpPr>
+          <p:nvPr>
+            <p:ph type="title"/>
+          </p:nvPr>
+        </p:nvSpPr>
+        <p:spPr>
+          <a:xfrm>
+            <a:off x="1141412" y="618518"/>
+            <a:ext cx="10364787" cy="1478570"/>
+          </a:xfrm>
+        </p:spPr>
+        <p:txBody>
+          <a:bodyPr>
+            <a:normAutofit fontScale="90000"/>
+          </a:bodyPr>
+          <a:lstStyle/>
+          <a:p>
+            <a:r>
+              <a:rPr lang="pt-BR" dirty="0"/>
+              <a:t>Foi encontrado uma saída de malha fechada com:</a:t>
+            </a:r>
+            <a:br>
+              <a:rPr lang="pt-BR" dirty="0"/>
+            </a:br>
+            <a:endParaRPr lang="pt-BR" dirty="0"/>
+          </a:p>
+        </p:txBody>
+      </p:sp>
+      <p:sp>
+        <p:nvSpPr>
+          <p:cNvPr id="3" name="Espaço Reservado para Conteúdo 2">
+            <a:extLst>
+              <a:ext uri="{FF2B5EF4-FFF2-40B4-BE49-F238E27FC236}">
+                <a16:creationId xmlns:a16="http://schemas.microsoft.com/office/drawing/2014/main" id="{E30F92DA-792C-4345-B346-356BC3E50938}"/>
+              </a:ext>
+            </a:extLst>
+          </p:cNvPr>
+          <p:cNvSpPr>
+            <a:spLocks noGrp="1"/>
+          </p:cNvSpPr>
+          <p:nvPr>
+            <p:ph idx="1"/>
+          </p:nvPr>
+        </p:nvSpPr>
+        <p:spPr/>
+        <p:txBody>
+          <a:bodyPr/>
+          <a:lstStyle/>
+          <a:p>
+            <a:pPr marL="0" indent="0">
+              <a:buNone/>
+            </a:pPr>
+            <a:r>
+              <a:rPr lang="pt-BR" dirty="0"/>
+              <a:t>Pico: 62,08</a:t>
+            </a:r>
+            <a:br>
+              <a:rPr lang="pt-BR" dirty="0"/>
+            </a:br>
+            <a:r>
+              <a:rPr lang="pt-BR" dirty="0"/>
+              <a:t>Tolerância de 24%</a:t>
+            </a:r>
+            <a:br>
+              <a:rPr lang="pt-BR" dirty="0"/>
+            </a:br>
+            <a:r>
+              <a:rPr lang="pt-BR" dirty="0"/>
+              <a:t>Tempo de acomodação: 30,118s</a:t>
+            </a:r>
+          </a:p>
+        </p:txBody>
+      </p:sp>
+    </p:spTree>
+    <p:extLst>
+      <p:ext uri="{BB962C8B-B14F-4D97-AF65-F5344CB8AC3E}">
+        <p14:creationId xmlns:p14="http://schemas.microsoft.com/office/powerpoint/2010/main" val="2217962978"/>
+      </p:ext>
+    </p:extLst>
+  </p:cSld>
+  <p:clrMapOvr>
+    <a:masterClrMapping/>
+  </p:clrMapOvr>
+</p:sld>
+</file>
+
+<file path=ppt/slides/slide9.xml><?xml version="1.0" encoding="utf-8"?>
 <p:sld xmlns:a="http://schemas.openxmlformats.org/drawingml/2006/main" xmlns:r="http://schemas.openxmlformats.org/officeDocument/2006/relationships" xmlns:p="http://schemas.openxmlformats.org/presentationml/2006/main">
   <p:cSld>
     <p:spTree>
@@ -13665,8 +14704,8 @@
         </p:blipFill>
         <p:spPr>
           <a:xfrm>
-            <a:off x="4726022" y="2249487"/>
-            <a:ext cx="2736779" cy="3541714"/>
+            <a:off x="4441193" y="2097088"/>
+            <a:ext cx="3306437" cy="4278918"/>
           </a:xfrm>
         </p:spPr>
       </p:pic>
@@ -13674,127 +14713,6 @@
     <p:extLst>
       <p:ext uri="{BB962C8B-B14F-4D97-AF65-F5344CB8AC3E}">
         <p14:creationId xmlns:p14="http://schemas.microsoft.com/office/powerpoint/2010/main" val="2151688904"/>
-      </p:ext>
-    </p:extLst>
-  </p:cSld>
-  <p:clrMapOvr>
-    <a:masterClrMapping/>
-  </p:clrMapOvr>
-</p:sld>
-</file>
-
-<file path=ppt/slides/slide7.xml><?xml version="1.0" encoding="utf-8"?>
-<p:sld xmlns:a="http://schemas.openxmlformats.org/drawingml/2006/main" xmlns:r="http://schemas.openxmlformats.org/officeDocument/2006/relationships" xmlns:p="http://schemas.openxmlformats.org/presentationml/2006/main">
-  <p:cSld>
-    <p:spTree>
-      <p:nvGrpSpPr>
-        <p:cNvPr id="1" name=""/>
-        <p:cNvGrpSpPr/>
-        <p:nvPr/>
-      </p:nvGrpSpPr>
-      <p:grpSpPr>
-        <a:xfrm>
-          <a:off x="0" y="0"/>
-          <a:ext cx="0" cy="0"/>
-          <a:chOff x="0" y="0"/>
-          <a:chExt cx="0" cy="0"/>
-        </a:xfrm>
-      </p:grpSpPr>
-      <p:sp>
-        <p:nvSpPr>
-          <p:cNvPr id="2" name="Title 1">
-            <a:extLst>
-              <a:ext uri="{FF2B5EF4-FFF2-40B4-BE49-F238E27FC236}">
-                <a16:creationId xmlns:a16="http://schemas.microsoft.com/office/drawing/2014/main" id="{8E65709B-49DD-8F12-0222-22E0521CB14E}"/>
-              </a:ext>
-            </a:extLst>
-          </p:cNvPr>
-          <p:cNvSpPr>
-            <a:spLocks noGrp="1"/>
-          </p:cNvSpPr>
-          <p:nvPr>
-            <p:ph type="title"/>
-          </p:nvPr>
-        </p:nvSpPr>
-        <p:spPr/>
-        <p:txBody>
-          <a:bodyPr>
-            <a:normAutofit/>
-          </a:bodyPr>
-          <a:lstStyle/>
-          <a:p>
-            <a:r>
-              <a:rPr lang="en-US" dirty="0"/>
-              <a:t>Grafico para o </a:t>
-            </a:r>
-            <a:r>
-              <a:rPr lang="en-US" dirty="0" err="1"/>
-              <a:t>maximo</a:t>
-            </a:r>
-            <a:r>
-              <a:rPr lang="en-US" dirty="0"/>
-              <a:t> de </a:t>
-            </a:r>
-            <a:r>
-              <a:rPr lang="en-US" dirty="0" err="1"/>
-              <a:t>pico</a:t>
-            </a:r>
-            <a:r>
-              <a:rPr lang="en-US" dirty="0"/>
-              <a:t> e tempo de </a:t>
-            </a:r>
-            <a:r>
-              <a:rPr lang="en-US" dirty="0" err="1"/>
-              <a:t>acomodação</a:t>
-            </a:r>
-            <a:r>
-              <a:rPr lang="en-US" dirty="0"/>
-              <a:t> novo, </a:t>
-            </a:r>
-            <a:r>
-              <a:rPr lang="en-US" dirty="0" err="1"/>
-              <a:t>kp</a:t>
-            </a:r>
-            <a:r>
-              <a:rPr lang="en-US" dirty="0"/>
-              <a:t>= 2,8</a:t>
-            </a:r>
-          </a:p>
-        </p:txBody>
-      </p:sp>
-      <p:pic>
-        <p:nvPicPr>
-          <p:cNvPr id="4" name="Picture 4" descr="Chart, line chart&#10;&#10;Description automatically generated">
-            <a:extLst>
-              <a:ext uri="{FF2B5EF4-FFF2-40B4-BE49-F238E27FC236}">
-                <a16:creationId xmlns:a16="http://schemas.microsoft.com/office/drawing/2014/main" id="{F26630D5-88F7-E7E9-1BA1-5294B7F3C4C4}"/>
-              </a:ext>
-            </a:extLst>
-          </p:cNvPr>
-          <p:cNvPicPr>
-            <a:picLocks noGrp="1" noChangeAspect="1"/>
-          </p:cNvPicPr>
-          <p:nvPr>
-            <p:ph idx="1"/>
-          </p:nvPr>
-        </p:nvPicPr>
-        <p:blipFill>
-          <a:blip r:embed="rId2"/>
-          <a:stretch>
-            <a:fillRect/>
-          </a:stretch>
-        </p:blipFill>
-        <p:spPr>
-          <a:xfrm>
-            <a:off x="3158275" y="2249487"/>
-            <a:ext cx="5872272" cy="3541714"/>
-          </a:xfrm>
-        </p:spPr>
-      </p:pic>
-    </p:spTree>
-    <p:extLst>
-      <p:ext uri="{BB962C8B-B14F-4D97-AF65-F5344CB8AC3E}">
-        <p14:creationId xmlns:p14="http://schemas.microsoft.com/office/powerpoint/2010/main" val="2360092736"/>
       </p:ext>
     </p:extLst>
   </p:cSld>

</xml_diff>